<commit_message>
update revisi penulisan dan slide persentasi
</commit_message>
<xml_diff>
--- a/ApplicationProjectSilde.pptx
+++ b/ApplicationProjectSilde.pptx
@@ -2292,7 +2292,7 @@
                 <a:cs typeface="Nunito Sans ExtraBold" charset="0"/>
                 <a:sym typeface="Arial" panose="020B0604020202020204" pitchFamily="34" charset="0"/>
               </a:rPr>
-              <a:t>APplcation </a:t>
+              <a:t>APplIcation </a:t>
             </a:r>
             <a:endParaRPr lang="en-US" altLang="zh-CN" cap="all" dirty="0">
               <a:solidFill>
@@ -2718,7 +2718,7 @@
         </p:nvSpPr>
         <p:spPr>
           <a:xfrm>
-            <a:off x="1828292" y="894688"/>
+            <a:off x="1828292" y="203173"/>
             <a:ext cx="6679292" cy="829945"/>
           </a:xfrm>
           <a:prstGeom prst="rect">
@@ -2763,8 +2763,8 @@
         </p:nvSpPr>
         <p:spPr>
           <a:xfrm>
-            <a:off x="1828165" y="1866900"/>
-            <a:ext cx="8906510" cy="3411220"/>
+            <a:off x="1828165" y="1097280"/>
+            <a:ext cx="9713595" cy="5373370"/>
           </a:xfrm>
           <a:prstGeom prst="rect">
             <a:avLst/>
@@ -2775,37 +2775,224 @@
             <a:noAutofit/>
           </a:bodyPr>
           <a:p>
-            <a:pPr lvl="0" algn="just"/>
-            <a:r>
-              <a:rPr lang="en-US" altLang="zh-CN" sz="2400" dirty="0">
-                <a:solidFill>
-                  <a:schemeClr val="tx1"/>
-                </a:solidFill>
-                <a:effectLst>
-                  <a:outerShdw blurRad="38100" dist="19050" dir="2700000" algn="tl" rotWithShape="0">
-                    <a:schemeClr val="dk1">
-                      <a:alpha val="40000"/>
-                    </a:schemeClr>
-                  </a:outerShdw>
-                </a:effectLst>
+            <a:pPr marL="342900" lvl="0" indent="-342900" algn="just">
+              <a:lnSpc>
+                <a:spcPct val="100000"/>
+              </a:lnSpc>
+              <a:buAutoNum type="arabicPeriod"/>
+            </a:pPr>
+            <a:r>
+              <a:rPr lang="en-US" altLang="zh-CN" sz="1600" dirty="0">
+                <a:effectLst/>
                 <a:latin typeface="Nunito Sans" charset="0"/>
                 <a:ea typeface="Nunito Sans" charset="0"/>
                 <a:cs typeface="Nunito Sans" charset="0"/>
                 <a:sym typeface="Arial" panose="020B0604020202020204" pitchFamily="34" charset="0"/>
               </a:rPr>
-              <a:t>Perkembangan teknologi informasi dan komunikasi yang pesat telah memberikan dampak yang signifikan pada berbagai aspek kehidupan, termasuk dalam bidang bisnis dan properti. Salah satu aspek yang terpengaruh adalah sistem penyewaan kos. Aceh, khususnya daerah Kuta Kosbanda, adalah wilayah yang memiliki tingkat mobilitas tinggi dengan banyak pendatang dari luar daerah yang mencari tempat tinggal sementara, seperti mahasiswa, pekerja, atau wisatawan.</a:t>
-            </a:r>
-            <a:endParaRPr lang="en-US" altLang="zh-CN" sz="2400" dirty="0">
-              <a:solidFill>
-                <a:schemeClr val="tx1"/>
-              </a:solidFill>
-              <a:effectLst>
-                <a:outerShdw blurRad="38100" dist="19050" dir="2700000" algn="tl" rotWithShape="0">
-                  <a:schemeClr val="dk1">
-                    <a:alpha val="40000"/>
-                  </a:schemeClr>
-                </a:outerShdw>
-              </a:effectLst>
+              <a:t>Perubahan Kehidupan dan Bisnis: Pesatnya perkembangan teknologi telah merubah cara hidup dan berbisnis, menciptakan tantangan baru serta peluang dalam penyediaan layanan dan produk.</a:t>
+            </a:r>
+            <a:endParaRPr lang="en-US" altLang="zh-CN" sz="1600" dirty="0">
+              <a:effectLst/>
+              <a:latin typeface="Nunito Sans" charset="0"/>
+              <a:ea typeface="Nunito Sans" charset="0"/>
+              <a:cs typeface="Nunito Sans" charset="0"/>
+              <a:sym typeface="Arial" panose="020B0604020202020204" pitchFamily="34" charset="0"/>
+            </a:endParaRPr>
+          </a:p>
+          <a:p>
+            <a:pPr marL="342900" lvl="0" indent="-342900" algn="just">
+              <a:lnSpc>
+                <a:spcPct val="100000"/>
+              </a:lnSpc>
+              <a:buAutoNum type="arabicPeriod"/>
+            </a:pPr>
+            <a:endParaRPr lang="en-US" altLang="zh-CN" sz="1600" dirty="0">
+              <a:effectLst/>
+              <a:latin typeface="Nunito Sans" charset="0"/>
+              <a:ea typeface="Nunito Sans" charset="0"/>
+              <a:cs typeface="Nunito Sans" charset="0"/>
+              <a:sym typeface="Arial" panose="020B0604020202020204" pitchFamily="34" charset="0"/>
+            </a:endParaRPr>
+          </a:p>
+          <a:p>
+            <a:pPr marL="342900" lvl="0" indent="-342900" algn="just">
+              <a:lnSpc>
+                <a:spcPct val="100000"/>
+              </a:lnSpc>
+              <a:buAutoNum type="arabicPeriod"/>
+            </a:pPr>
+            <a:r>
+              <a:rPr lang="en-US" altLang="zh-CN" sz="1600" dirty="0">
+                <a:effectLst/>
+                <a:latin typeface="Nunito Sans" charset="0"/>
+                <a:ea typeface="Nunito Sans" charset="0"/>
+                <a:cs typeface="Nunito Sans" charset="0"/>
+                <a:sym typeface="Arial" panose="020B0604020202020204" pitchFamily="34" charset="0"/>
+              </a:rPr>
+              <a:t>Mobilitas Tinggi di Kos Banda Aceh: Wilayah ini memiliki mobilitas tinggi dari mahasiswa, pekerja, dan wisatawan, menciptakan fluktuasi permintaan tempat tinggal yang perlu diantisipasi.</a:t>
+            </a:r>
+            <a:endParaRPr lang="en-US" altLang="zh-CN" sz="1600" dirty="0">
+              <a:effectLst/>
+              <a:latin typeface="Nunito Sans" charset="0"/>
+              <a:ea typeface="Nunito Sans" charset="0"/>
+              <a:cs typeface="Nunito Sans" charset="0"/>
+              <a:sym typeface="Arial" panose="020B0604020202020204" pitchFamily="34" charset="0"/>
+            </a:endParaRPr>
+          </a:p>
+          <a:p>
+            <a:pPr marL="342900" lvl="0" indent="-342900" algn="just">
+              <a:lnSpc>
+                <a:spcPct val="100000"/>
+              </a:lnSpc>
+              <a:buAutoNum type="arabicPeriod"/>
+            </a:pPr>
+            <a:endParaRPr lang="en-US" altLang="zh-CN" sz="1600" dirty="0">
+              <a:effectLst/>
+              <a:latin typeface="Nunito Sans" charset="0"/>
+              <a:ea typeface="Nunito Sans" charset="0"/>
+              <a:cs typeface="Nunito Sans" charset="0"/>
+              <a:sym typeface="Arial" panose="020B0604020202020204" pitchFamily="34" charset="0"/>
+            </a:endParaRPr>
+          </a:p>
+          <a:p>
+            <a:pPr marL="342900" lvl="0" indent="-342900" algn="just">
+              <a:lnSpc>
+                <a:spcPct val="100000"/>
+              </a:lnSpc>
+              <a:buAutoNum type="arabicPeriod"/>
+            </a:pPr>
+            <a:r>
+              <a:rPr lang="en-US" altLang="zh-CN" sz="1600" dirty="0">
+                <a:effectLst/>
+                <a:latin typeface="Nunito Sans" charset="0"/>
+                <a:ea typeface="Nunito Sans" charset="0"/>
+                <a:cs typeface="Nunito Sans" charset="0"/>
+                <a:sym typeface="Arial" panose="020B0604020202020204" pitchFamily="34" charset="0"/>
+              </a:rPr>
+              <a:t>Kebutuhan Efisiensi dan Kenyamanan: Mobilitas tinggi ini juga memunculkan kebutuhan akan penyewaan kos yang efisien dan nyaman, agar pendatang dapat fokus pada tujuan kunjungan mereka.</a:t>
+            </a:r>
+            <a:endParaRPr lang="en-US" altLang="zh-CN" sz="1600" dirty="0">
+              <a:effectLst/>
+              <a:latin typeface="Nunito Sans" charset="0"/>
+              <a:ea typeface="Nunito Sans" charset="0"/>
+              <a:cs typeface="Nunito Sans" charset="0"/>
+              <a:sym typeface="Arial" panose="020B0604020202020204" pitchFamily="34" charset="0"/>
+            </a:endParaRPr>
+          </a:p>
+          <a:p>
+            <a:pPr marL="342900" lvl="0" indent="-342900" algn="just">
+              <a:lnSpc>
+                <a:spcPct val="100000"/>
+              </a:lnSpc>
+              <a:buAutoNum type="arabicPeriod"/>
+            </a:pPr>
+            <a:endParaRPr lang="en-US" altLang="zh-CN" sz="1600" dirty="0">
+              <a:effectLst/>
+              <a:latin typeface="Nunito Sans" charset="0"/>
+              <a:ea typeface="Nunito Sans" charset="0"/>
+              <a:cs typeface="Nunito Sans" charset="0"/>
+              <a:sym typeface="Arial" panose="020B0604020202020204" pitchFamily="34" charset="0"/>
+            </a:endParaRPr>
+          </a:p>
+          <a:p>
+            <a:pPr marL="342900" lvl="0" indent="-342900" algn="just">
+              <a:lnSpc>
+                <a:spcPct val="100000"/>
+              </a:lnSpc>
+              <a:buAutoNum type="arabicPeriod"/>
+            </a:pPr>
+            <a:r>
+              <a:rPr lang="en-US" altLang="zh-CN" sz="1600" dirty="0">
+                <a:effectLst/>
+                <a:latin typeface="Nunito Sans" charset="0"/>
+                <a:ea typeface="Nunito Sans" charset="0"/>
+                <a:cs typeface="Nunito Sans" charset="0"/>
+                <a:sym typeface="Arial" panose="020B0604020202020204" pitchFamily="34" charset="0"/>
+              </a:rPr>
+              <a:t>Solusi Berbasis Mobile: Mengingat perubahan perilaku pengguna yang cenderung mengandalkan perangkat mobile, pengembangan sistem penyewaan kos berbasis aplikasi mobile dapat menjadi solusi efektif dalam mengatasi kebutuhan akan informasi dan layanan penyewaan.</a:t>
+            </a:r>
+            <a:endParaRPr lang="en-US" altLang="zh-CN" sz="1600" dirty="0">
+              <a:effectLst/>
+              <a:latin typeface="Nunito Sans" charset="0"/>
+              <a:ea typeface="Nunito Sans" charset="0"/>
+              <a:cs typeface="Nunito Sans" charset="0"/>
+              <a:sym typeface="Arial" panose="020B0604020202020204" pitchFamily="34" charset="0"/>
+            </a:endParaRPr>
+          </a:p>
+          <a:p>
+            <a:pPr marL="342900" lvl="0" indent="-342900" algn="just">
+              <a:lnSpc>
+                <a:spcPct val="100000"/>
+              </a:lnSpc>
+              <a:buAutoNum type="arabicPeriod"/>
+            </a:pPr>
+            <a:endParaRPr lang="en-US" altLang="zh-CN" sz="1600" dirty="0">
+              <a:effectLst/>
+              <a:latin typeface="Nunito Sans" charset="0"/>
+              <a:ea typeface="Nunito Sans" charset="0"/>
+              <a:cs typeface="Nunito Sans" charset="0"/>
+              <a:sym typeface="Arial" panose="020B0604020202020204" pitchFamily="34" charset="0"/>
+            </a:endParaRPr>
+          </a:p>
+          <a:p>
+            <a:pPr marL="342900" lvl="0" indent="-342900" algn="just">
+              <a:lnSpc>
+                <a:spcPct val="100000"/>
+              </a:lnSpc>
+              <a:buAutoNum type="arabicPeriod"/>
+            </a:pPr>
+            <a:r>
+              <a:rPr lang="en-US" altLang="zh-CN" sz="1600" dirty="0">
+                <a:effectLst/>
+                <a:latin typeface="Nunito Sans" charset="0"/>
+                <a:ea typeface="Nunito Sans" charset="0"/>
+                <a:cs typeface="Nunito Sans" charset="0"/>
+                <a:sym typeface="Arial" panose="020B0604020202020204" pitchFamily="34" charset="0"/>
+              </a:rPr>
+              <a:t>Tantangan Kompleksitas: Berbagai tipe pendatang (mahasiswa, pekerja, dan wisatawan) memiliki preferensi dan kebutuhan yang berbeda, menghadirkan tantangan dalam menyediakan pilihan kos yang sesuai.</a:t>
+            </a:r>
+            <a:endParaRPr lang="en-US" altLang="zh-CN" sz="1600" dirty="0">
+              <a:effectLst/>
+              <a:latin typeface="Nunito Sans" charset="0"/>
+              <a:ea typeface="Nunito Sans" charset="0"/>
+              <a:cs typeface="Nunito Sans" charset="0"/>
+              <a:sym typeface="Arial" panose="020B0604020202020204" pitchFamily="34" charset="0"/>
+            </a:endParaRPr>
+          </a:p>
+          <a:p>
+            <a:pPr marL="342900" lvl="0" indent="-342900" algn="just">
+              <a:lnSpc>
+                <a:spcPct val="100000"/>
+              </a:lnSpc>
+              <a:buAutoNum type="arabicPeriod"/>
+            </a:pPr>
+            <a:endParaRPr lang="en-US" altLang="zh-CN" sz="1600" dirty="0">
+              <a:effectLst/>
+              <a:latin typeface="Nunito Sans" charset="0"/>
+              <a:ea typeface="Nunito Sans" charset="0"/>
+              <a:cs typeface="Nunito Sans" charset="0"/>
+              <a:sym typeface="Arial" panose="020B0604020202020204" pitchFamily="34" charset="0"/>
+            </a:endParaRPr>
+          </a:p>
+          <a:p>
+            <a:pPr marL="342900" lvl="0" indent="-342900" algn="just">
+              <a:lnSpc>
+                <a:spcPct val="100000"/>
+              </a:lnSpc>
+              <a:buAutoNum type="arabicPeriod"/>
+            </a:pPr>
+            <a:r>
+              <a:rPr lang="en-US" altLang="zh-CN" sz="1600" dirty="0">
+                <a:effectLst/>
+                <a:latin typeface="Nunito Sans" charset="0"/>
+                <a:ea typeface="Nunito Sans" charset="0"/>
+                <a:cs typeface="Nunito Sans" charset="0"/>
+                <a:sym typeface="Arial" panose="020B0604020202020204" pitchFamily="34" charset="0"/>
+              </a:rPr>
+              <a:t>Efek Terhadap Bisnis Properti: Pengaruh mobilitas tinggi pada permintaan tempat tinggal sementara memiliki potensi dalam mendorong bisnis properti di wilayah tersebut.</a:t>
+            </a:r>
+            <a:endParaRPr lang="en-US" altLang="zh-CN" sz="1600" dirty="0">
+              <a:effectLst/>
               <a:latin typeface="Nunito Sans" charset="0"/>
               <a:ea typeface="Nunito Sans" charset="0"/>
               <a:cs typeface="Nunito Sans" charset="0"/>
@@ -3121,22 +3308,16 @@
             <a:spAutoFit/>
           </a:bodyPr>
           <a:p>
-            <a:pPr marL="285750" lvl="0" indent="-285750" algn="l">
+            <a:pPr marL="342900" lvl="0" indent="-342900" algn="l">
               <a:buFont typeface="Arial" panose="020B0604020202020204" pitchFamily="34" charset="0"/>
-              <a:buChar char="•"/>
+              <a:buAutoNum type="arabicPeriod"/>
             </a:pPr>
             <a:r>
               <a:rPr lang="en-US" altLang="zh-CN" sz="1600" dirty="0">
                 <a:solidFill>
                   <a:schemeClr val="tx1"/>
                 </a:solidFill>
-                <a:effectLst>
-                  <a:outerShdw blurRad="38100" dist="19050" dir="2700000" algn="tl" rotWithShape="0">
-                    <a:schemeClr val="dk1">
-                      <a:alpha val="40000"/>
-                    </a:schemeClr>
-                  </a:outerShdw>
-                </a:effectLst>
+                <a:effectLst/>
                 <a:latin typeface="Nunito Sans" charset="0"/>
                 <a:ea typeface="Nunito Sans" charset="0"/>
                 <a:cs typeface="Nunito Sans" charset="0"/>
@@ -3148,13 +3329,7 @@
               <a:solidFill>
                 <a:schemeClr val="tx1"/>
               </a:solidFill>
-              <a:effectLst>
-                <a:outerShdw blurRad="38100" dist="19050" dir="2700000" algn="tl" rotWithShape="0">
-                  <a:schemeClr val="dk1">
-                    <a:alpha val="40000"/>
-                  </a:schemeClr>
-                </a:outerShdw>
-              </a:effectLst>
+              <a:effectLst/>
               <a:latin typeface="Nunito Sans" charset="0"/>
               <a:ea typeface="Nunito Sans" charset="0"/>
               <a:cs typeface="Nunito Sans" charset="0"/>
@@ -3162,21 +3337,15 @@
             </a:endParaRPr>
           </a:p>
           <a:p>
-            <a:pPr marL="285750" lvl="0" indent="-285750" algn="l">
+            <a:pPr marL="342900" lvl="0" indent="-342900" algn="l">
               <a:buFont typeface="Arial" panose="020B0604020202020204" pitchFamily="34" charset="0"/>
-              <a:buChar char="•"/>
+              <a:buAutoNum type="arabicPeriod"/>
             </a:pPr>
             <a:endParaRPr lang="en-US" altLang="zh-CN" sz="1600" dirty="0">
               <a:solidFill>
                 <a:schemeClr val="tx1"/>
               </a:solidFill>
-              <a:effectLst>
-                <a:outerShdw blurRad="38100" dist="19050" dir="2700000" algn="tl" rotWithShape="0">
-                  <a:schemeClr val="dk1">
-                    <a:alpha val="40000"/>
-                  </a:schemeClr>
-                </a:outerShdw>
-              </a:effectLst>
+              <a:effectLst/>
               <a:latin typeface="Nunito Sans" charset="0"/>
               <a:ea typeface="Nunito Sans" charset="0"/>
               <a:cs typeface="Nunito Sans" charset="0"/>
@@ -3184,22 +3353,16 @@
             </a:endParaRPr>
           </a:p>
           <a:p>
-            <a:pPr marL="285750" lvl="0" indent="-285750" algn="l">
+            <a:pPr marL="342900" lvl="0" indent="-342900" algn="l">
               <a:buFont typeface="Arial" panose="020B0604020202020204" pitchFamily="34" charset="0"/>
-              <a:buChar char="•"/>
+              <a:buAutoNum type="arabicPeriod"/>
             </a:pPr>
             <a:r>
               <a:rPr lang="en-US" altLang="zh-CN" sz="1600" dirty="0">
                 <a:solidFill>
                   <a:schemeClr val="tx1"/>
                 </a:solidFill>
-                <a:effectLst>
-                  <a:outerShdw blurRad="38100" dist="19050" dir="2700000" algn="tl" rotWithShape="0">
-                    <a:schemeClr val="dk1">
-                      <a:alpha val="40000"/>
-                    </a:schemeClr>
-                  </a:outerShdw>
-                </a:effectLst>
+                <a:effectLst/>
                 <a:latin typeface="Nunito Sans" charset="0"/>
                 <a:ea typeface="Nunito Sans" charset="0"/>
                 <a:cs typeface="Nunito Sans" charset="0"/>
@@ -3211,13 +3374,7 @@
               <a:solidFill>
                 <a:schemeClr val="tx1"/>
               </a:solidFill>
-              <a:effectLst>
-                <a:outerShdw blurRad="38100" dist="19050" dir="2700000" algn="tl" rotWithShape="0">
-                  <a:schemeClr val="dk1">
-                    <a:alpha val="40000"/>
-                  </a:schemeClr>
-                </a:outerShdw>
-              </a:effectLst>
+              <a:effectLst/>
               <a:latin typeface="Nunito Sans" charset="0"/>
               <a:ea typeface="Nunito Sans" charset="0"/>
               <a:cs typeface="Nunito Sans" charset="0"/>
@@ -3225,21 +3382,15 @@
             </a:endParaRPr>
           </a:p>
           <a:p>
-            <a:pPr marL="285750" lvl="0" indent="-285750" algn="l">
+            <a:pPr marL="342900" lvl="0" indent="-342900" algn="l">
               <a:buFont typeface="Arial" panose="020B0604020202020204" pitchFamily="34" charset="0"/>
-              <a:buChar char="•"/>
+              <a:buAutoNum type="arabicPeriod"/>
             </a:pPr>
             <a:endParaRPr lang="en-US" altLang="zh-CN" sz="1600" dirty="0">
               <a:solidFill>
                 <a:schemeClr val="tx1"/>
               </a:solidFill>
-              <a:effectLst>
-                <a:outerShdw blurRad="38100" dist="19050" dir="2700000" algn="tl" rotWithShape="0">
-                  <a:schemeClr val="dk1">
-                    <a:alpha val="40000"/>
-                  </a:schemeClr>
-                </a:outerShdw>
-              </a:effectLst>
+              <a:effectLst/>
               <a:latin typeface="Nunito Sans" charset="0"/>
               <a:ea typeface="Nunito Sans" charset="0"/>
               <a:cs typeface="Nunito Sans" charset="0"/>
@@ -3247,22 +3398,16 @@
             </a:endParaRPr>
           </a:p>
           <a:p>
-            <a:pPr marL="285750" lvl="0" indent="-285750" algn="l">
+            <a:pPr marL="342900" lvl="0" indent="-342900" algn="l">
               <a:buFont typeface="Arial" panose="020B0604020202020204" pitchFamily="34" charset="0"/>
-              <a:buChar char="•"/>
+              <a:buAutoNum type="arabicPeriod"/>
             </a:pPr>
             <a:r>
               <a:rPr lang="en-US" altLang="zh-CN" sz="1600" dirty="0">
                 <a:solidFill>
                   <a:schemeClr val="tx1"/>
                 </a:solidFill>
-                <a:effectLst>
-                  <a:outerShdw blurRad="38100" dist="19050" dir="2700000" algn="tl" rotWithShape="0">
-                    <a:schemeClr val="dk1">
-                      <a:alpha val="40000"/>
-                    </a:schemeClr>
-                  </a:outerShdw>
-                </a:effectLst>
+                <a:effectLst/>
                 <a:latin typeface="Nunito Sans" charset="0"/>
                 <a:ea typeface="Nunito Sans" charset="0"/>
                 <a:cs typeface="Nunito Sans" charset="0"/>
@@ -3274,13 +3419,7 @@
               <a:solidFill>
                 <a:schemeClr val="tx1"/>
               </a:solidFill>
-              <a:effectLst>
-                <a:outerShdw blurRad="38100" dist="19050" dir="2700000" algn="tl" rotWithShape="0">
-                  <a:schemeClr val="dk1">
-                    <a:alpha val="40000"/>
-                  </a:schemeClr>
-                </a:outerShdw>
-              </a:effectLst>
+              <a:effectLst/>
               <a:latin typeface="Nunito Sans" charset="0"/>
               <a:ea typeface="Nunito Sans" charset="0"/>
               <a:cs typeface="Nunito Sans" charset="0"/>
@@ -3288,21 +3427,15 @@
             </a:endParaRPr>
           </a:p>
           <a:p>
-            <a:pPr marL="285750" lvl="0" indent="-285750" algn="l">
+            <a:pPr marL="342900" lvl="0" indent="-342900" algn="l">
               <a:buFont typeface="Arial" panose="020B0604020202020204" pitchFamily="34" charset="0"/>
-              <a:buChar char="•"/>
+              <a:buAutoNum type="arabicPeriod"/>
             </a:pPr>
             <a:endParaRPr lang="en-US" altLang="zh-CN" sz="1600" dirty="0">
               <a:solidFill>
                 <a:schemeClr val="tx1"/>
               </a:solidFill>
-              <a:effectLst>
-                <a:outerShdw blurRad="38100" dist="19050" dir="2700000" algn="tl" rotWithShape="0">
-                  <a:schemeClr val="dk1">
-                    <a:alpha val="40000"/>
-                  </a:schemeClr>
-                </a:outerShdw>
-              </a:effectLst>
+              <a:effectLst/>
               <a:latin typeface="Nunito Sans" charset="0"/>
               <a:ea typeface="Nunito Sans" charset="0"/>
               <a:cs typeface="Nunito Sans" charset="0"/>
@@ -3310,22 +3443,16 @@
             </a:endParaRPr>
           </a:p>
           <a:p>
-            <a:pPr marL="285750" lvl="0" indent="-285750" algn="l">
+            <a:pPr marL="342900" lvl="0" indent="-342900" algn="l">
               <a:buFont typeface="Arial" panose="020B0604020202020204" pitchFamily="34" charset="0"/>
-              <a:buChar char="•"/>
+              <a:buAutoNum type="arabicPeriod"/>
             </a:pPr>
             <a:r>
               <a:rPr lang="en-US" altLang="zh-CN" sz="1600" dirty="0">
                 <a:solidFill>
                   <a:schemeClr val="tx1"/>
                 </a:solidFill>
-                <a:effectLst>
-                  <a:outerShdw blurRad="38100" dist="19050" dir="2700000" algn="tl" rotWithShape="0">
-                    <a:schemeClr val="dk1">
-                      <a:alpha val="40000"/>
-                    </a:schemeClr>
-                  </a:outerShdw>
-                </a:effectLst>
+                <a:effectLst/>
                 <a:latin typeface="Nunito Sans" charset="0"/>
                 <a:ea typeface="Nunito Sans" charset="0"/>
                 <a:cs typeface="Nunito Sans" charset="0"/>
@@ -3337,13 +3464,7 @@
               <a:solidFill>
                 <a:schemeClr val="tx1"/>
               </a:solidFill>
-              <a:effectLst>
-                <a:outerShdw blurRad="38100" dist="19050" dir="2700000" algn="tl" rotWithShape="0">
-                  <a:schemeClr val="dk1">
-                    <a:alpha val="40000"/>
-                  </a:schemeClr>
-                </a:outerShdw>
-              </a:effectLst>
+              <a:effectLst/>
               <a:latin typeface="Nunito Sans" charset="0"/>
               <a:ea typeface="Nunito Sans" charset="0"/>
               <a:cs typeface="Nunito Sans" charset="0"/>
@@ -3351,21 +3472,15 @@
             </a:endParaRPr>
           </a:p>
           <a:p>
-            <a:pPr marL="285750" lvl="0" indent="-285750" algn="l">
+            <a:pPr marL="342900" lvl="0" indent="-342900" algn="l">
               <a:buFont typeface="Arial" panose="020B0604020202020204" pitchFamily="34" charset="0"/>
-              <a:buChar char="•"/>
+              <a:buAutoNum type="arabicPeriod"/>
             </a:pPr>
             <a:endParaRPr lang="en-US" altLang="zh-CN" sz="1600" dirty="0">
               <a:solidFill>
                 <a:schemeClr val="tx1"/>
               </a:solidFill>
-              <a:effectLst>
-                <a:outerShdw blurRad="38100" dist="19050" dir="2700000" algn="tl" rotWithShape="0">
-                  <a:schemeClr val="dk1">
-                    <a:alpha val="40000"/>
-                  </a:schemeClr>
-                </a:outerShdw>
-              </a:effectLst>
+              <a:effectLst/>
               <a:latin typeface="Nunito Sans" charset="0"/>
               <a:ea typeface="Nunito Sans" charset="0"/>
               <a:cs typeface="Nunito Sans" charset="0"/>
@@ -3373,22 +3488,16 @@
             </a:endParaRPr>
           </a:p>
           <a:p>
-            <a:pPr marL="285750" lvl="0" indent="-285750" algn="l">
+            <a:pPr marL="342900" lvl="0" indent="-342900" algn="l">
               <a:buFont typeface="Arial" panose="020B0604020202020204" pitchFamily="34" charset="0"/>
-              <a:buChar char="•"/>
+              <a:buAutoNum type="arabicPeriod"/>
             </a:pPr>
             <a:r>
               <a:rPr lang="en-US" altLang="zh-CN" sz="1600" dirty="0">
                 <a:solidFill>
                   <a:schemeClr val="tx1"/>
                 </a:solidFill>
-                <a:effectLst>
-                  <a:outerShdw blurRad="38100" dist="19050" dir="2700000" algn="tl" rotWithShape="0">
-                    <a:schemeClr val="dk1">
-                      <a:alpha val="40000"/>
-                    </a:schemeClr>
-                  </a:outerShdw>
-                </a:effectLst>
+                <a:effectLst/>
                 <a:latin typeface="Nunito Sans" charset="0"/>
                 <a:ea typeface="Nunito Sans" charset="0"/>
                 <a:cs typeface="Nunito Sans" charset="0"/>
@@ -3400,13 +3509,7 @@
               <a:solidFill>
                 <a:schemeClr val="tx1"/>
               </a:solidFill>
-              <a:effectLst>
-                <a:outerShdw blurRad="38100" dist="19050" dir="2700000" algn="tl" rotWithShape="0">
-                  <a:schemeClr val="dk1">
-                    <a:alpha val="40000"/>
-                  </a:schemeClr>
-                </a:outerShdw>
-              </a:effectLst>
+              <a:effectLst/>
               <a:latin typeface="Nunito Sans" charset="0"/>
               <a:ea typeface="Nunito Sans" charset="0"/>
               <a:cs typeface="Nunito Sans" charset="0"/>
@@ -3548,24 +3651,12 @@
             </a:pPr>
             <a:r>
               <a:rPr lang="en-US" sz="1600">
-                <a:effectLst>
-                  <a:outerShdw blurRad="38100" dist="38100" dir="2700000" algn="tl">
-                    <a:srgbClr val="000000">
-                      <a:alpha val="43137"/>
-                    </a:srgbClr>
-                  </a:outerShdw>
-                </a:effectLst>
+                <a:effectLst/>
               </a:rPr>
               <a:t>Platform Aplikasi: Penelitian ini terfokus pada pengembangan aplikasi mobile menggunakan teknologi Flutter dengan minimum SDK version Android 21. </a:t>
             </a:r>
             <a:endParaRPr lang="en-US" sz="1600">
-              <a:effectLst>
-                <a:outerShdw blurRad="38100" dist="38100" dir="2700000" algn="tl">
-                  <a:srgbClr val="000000">
-                    <a:alpha val="43137"/>
-                  </a:srgbClr>
-                </a:outerShdw>
-              </a:effectLst>
+              <a:effectLst/>
             </a:endParaRPr>
           </a:p>
           <a:p>
@@ -3573,13 +3664,7 @@
               <a:buAutoNum type="arabicPeriod"/>
             </a:pPr>
             <a:endParaRPr lang="en-US" sz="1600">
-              <a:effectLst>
-                <a:outerShdw blurRad="38100" dist="38100" dir="2700000" algn="tl">
-                  <a:srgbClr val="000000">
-                    <a:alpha val="43137"/>
-                  </a:srgbClr>
-                </a:outerShdw>
-              </a:effectLst>
+              <a:effectLst/>
             </a:endParaRPr>
           </a:p>
           <a:p>
@@ -3588,24 +3673,12 @@
             </a:pPr>
             <a:r>
               <a:rPr lang="en-US" sz="1600">
-                <a:effectLst>
-                  <a:outerShdw blurRad="38100" dist="38100" dir="2700000" algn="tl">
-                    <a:srgbClr val="000000">
-                      <a:alpha val="43137"/>
-                    </a:srgbClr>
-                  </a:outerShdw>
-                </a:effectLst>
+                <a:effectLst/>
               </a:rPr>
               <a:t>Pemilik Kos: Penelitian ini membatasi jumlah pemilik kos hanya satu, dengan tidak mempertimbangkan model multi vendor. </a:t>
             </a:r>
             <a:endParaRPr lang="en-US" sz="1600">
-              <a:effectLst>
-                <a:outerShdw blurRad="38100" dist="38100" dir="2700000" algn="tl">
-                  <a:srgbClr val="000000">
-                    <a:alpha val="43137"/>
-                  </a:srgbClr>
-                </a:outerShdw>
-              </a:effectLst>
+              <a:effectLst/>
             </a:endParaRPr>
           </a:p>
           <a:p>
@@ -3613,13 +3686,7 @@
               <a:buAutoNum type="arabicPeriod"/>
             </a:pPr>
             <a:endParaRPr lang="en-US" sz="1600">
-              <a:effectLst>
-                <a:outerShdw blurRad="38100" dist="38100" dir="2700000" algn="tl">
-                  <a:srgbClr val="000000">
-                    <a:alpha val="43137"/>
-                  </a:srgbClr>
-                </a:outerShdw>
-              </a:effectLst>
+              <a:effectLst/>
             </a:endParaRPr>
           </a:p>
           <a:p>
@@ -3628,24 +3695,12 @@
             </a:pPr>
             <a:r>
               <a:rPr lang="en-US" sz="1600">
-                <a:effectLst>
-                  <a:outerShdw blurRad="38100" dist="38100" dir="2700000" algn="tl">
-                    <a:srgbClr val="000000">
-                      <a:alpha val="43137"/>
-                    </a:srgbClr>
-                  </a:outerShdw>
-                </a:effectLst>
+                <a:effectLst/>
               </a:rPr>
               <a:t>Lokasi Penelitian: Penelitian ini difokuskan di wilayah Kuta Kos Banda Aceh, tanpa mempertimbangkan lokasi di luar wilayah tersebut.</a:t>
             </a:r>
             <a:endParaRPr lang="en-US" sz="1600">
-              <a:effectLst>
-                <a:outerShdw blurRad="38100" dist="38100" dir="2700000" algn="tl">
-                  <a:srgbClr val="000000">
-                    <a:alpha val="43137"/>
-                  </a:srgbClr>
-                </a:outerShdw>
-              </a:effectLst>
+              <a:effectLst/>
             </a:endParaRPr>
           </a:p>
           <a:p>
@@ -3653,13 +3708,7 @@
               <a:buAutoNum type="arabicPeriod"/>
             </a:pPr>
             <a:endParaRPr lang="en-US" sz="1600">
-              <a:effectLst>
-                <a:outerShdw blurRad="38100" dist="38100" dir="2700000" algn="tl">
-                  <a:srgbClr val="000000">
-                    <a:alpha val="43137"/>
-                  </a:srgbClr>
-                </a:outerShdw>
-              </a:effectLst>
+              <a:effectLst/>
             </a:endParaRPr>
           </a:p>
           <a:p>
@@ -3668,24 +3717,12 @@
             </a:pPr>
             <a:r>
               <a:rPr lang="en-US" sz="1600">
-                <a:effectLst>
-                  <a:outerShdw blurRad="38100" dist="38100" dir="2700000" algn="tl">
-                    <a:srgbClr val="000000">
-                      <a:alpha val="43137"/>
-                    </a:srgbClr>
-                  </a:outerShdw>
-                </a:effectLst>
+                <a:effectLst/>
               </a:rPr>
               <a:t>Tidak Memasukkan Pembayaran: Penelitian ini tidak akan mengimplementasikan fitur pembayaran dalam aplikasi.</a:t>
             </a:r>
             <a:endParaRPr lang="en-US" sz="1600">
-              <a:effectLst>
-                <a:outerShdw blurRad="38100" dist="38100" dir="2700000" algn="tl">
-                  <a:srgbClr val="000000">
-                    <a:alpha val="43137"/>
-                  </a:srgbClr>
-                </a:outerShdw>
-              </a:effectLst>
+              <a:effectLst/>
             </a:endParaRPr>
           </a:p>
           <a:p>
@@ -3693,13 +3730,7 @@
               <a:buAutoNum type="arabicPeriod"/>
             </a:pPr>
             <a:endParaRPr lang="en-US" sz="1600">
-              <a:effectLst>
-                <a:outerShdw blurRad="38100" dist="38100" dir="2700000" algn="tl">
-                  <a:srgbClr val="000000">
-                    <a:alpha val="43137"/>
-                  </a:srgbClr>
-                </a:outerShdw>
-              </a:effectLst>
+              <a:effectLst/>
             </a:endParaRPr>
           </a:p>
           <a:p>
@@ -3708,24 +3739,12 @@
             </a:pPr>
             <a:r>
               <a:rPr lang="en-US" sz="1600">
-                <a:effectLst>
-                  <a:outerShdw blurRad="38100" dist="38100" dir="2700000" algn="tl">
-                    <a:srgbClr val="000000">
-                      <a:alpha val="43137"/>
-                    </a:srgbClr>
-                  </a:outerShdw>
-                </a:effectLst>
+                <a:effectLst/>
               </a:rPr>
               <a:t>Tidak Memasukkan Fitur Pemberitahuan (Notifikasi): Penelitian ini tidak akan mencakup pengembangan fitur pemberitahuan (notifikasi) kepada pengguna.</a:t>
             </a:r>
             <a:endParaRPr lang="en-US" sz="1600">
-              <a:effectLst>
-                <a:outerShdw blurRad="38100" dist="38100" dir="2700000" algn="tl">
-                  <a:srgbClr val="000000">
-                    <a:alpha val="43137"/>
-                  </a:srgbClr>
-                </a:outerShdw>
-              </a:effectLst>
+              <a:effectLst/>
             </a:endParaRPr>
           </a:p>
           <a:p>
@@ -3733,13 +3752,7 @@
               <a:buAutoNum type="arabicPeriod"/>
             </a:pPr>
             <a:endParaRPr lang="en-US" sz="1600">
-              <a:effectLst>
-                <a:outerShdw blurRad="38100" dist="38100" dir="2700000" algn="tl">
-                  <a:srgbClr val="000000">
-                    <a:alpha val="43137"/>
-                  </a:srgbClr>
-                </a:outerShdw>
-              </a:effectLst>
+              <a:effectLst/>
             </a:endParaRPr>
           </a:p>
           <a:p>
@@ -3748,58 +3761,28 @@
             </a:pPr>
             <a:r>
               <a:rPr lang="en-US" sz="1600">
-                <a:effectLst>
-                  <a:outerShdw blurRad="38100" dist="38100" dir="2700000" algn="tl">
-                    <a:srgbClr val="000000">
-                      <a:alpha val="43137"/>
-                    </a:srgbClr>
-                  </a:outerShdw>
-                </a:effectLst>
+                <a:effectLst/>
               </a:rPr>
               <a:t>Tidak Memasukkan Fungsi Ulasan dan Rating: Penelitian ini tidak akan mengimplementasikan fitur ulasan dan rating terhadap kos yang disewa.</a:t>
             </a:r>
             <a:endParaRPr lang="en-US" sz="1600">
-              <a:effectLst>
-                <a:outerShdw blurRad="38100" dist="38100" dir="2700000" algn="tl">
-                  <a:srgbClr val="000000">
-                    <a:alpha val="43137"/>
-                  </a:srgbClr>
-                </a:outerShdw>
-              </a:effectLst>
+              <a:effectLst/>
             </a:endParaRPr>
           </a:p>
           <a:p>
             <a:endParaRPr lang="en-US" sz="1600">
-              <a:effectLst>
-                <a:outerShdw blurRad="38100" dist="38100" dir="2700000" algn="tl">
-                  <a:srgbClr val="000000">
-                    <a:alpha val="43137"/>
-                  </a:srgbClr>
-                </a:outerShdw>
-              </a:effectLst>
+              <a:effectLst/>
             </a:endParaRPr>
           </a:p>
           <a:p>
             <a:r>
               <a:rPr lang="en-US" sz="1600">
-                <a:effectLst>
-                  <a:outerShdw blurRad="38100" dist="38100" dir="2700000" algn="tl">
-                    <a:srgbClr val="000000">
-                      <a:alpha val="43137"/>
-                    </a:srgbClr>
-                  </a:outerShdw>
-                </a:effectLst>
+                <a:effectLst/>
               </a:rPr>
               <a:t>Dengan batasan-batasan ini, penelitian akan fokus pada pengembangan aplikasi penyewaan kos yang sesuai dengan kebutuhan dasar pengguna, dengan pemilik kos tunggal, dan berfokus pada interaksi pengguna dalam melihat, mencari, dan menyewa kos yang tersedia, serta melihat riwayat penyewaan.</a:t>
             </a:r>
             <a:endParaRPr lang="en-US" sz="1600">
-              <a:effectLst>
-                <a:outerShdw blurRad="38100" dist="38100" dir="2700000" algn="tl">
-                  <a:srgbClr val="000000">
-                    <a:alpha val="43137"/>
-                  </a:srgbClr>
-                </a:outerShdw>
-              </a:effectLst>
+              <a:effectLst/>
             </a:endParaRPr>
           </a:p>
         </p:txBody>

</xml_diff>